<commit_message>
* Bugfix: Engine Only mode didn't work * Mission profiles are shown in VECTO Editor in Declaration Mode * Removed "Extrapolation not possible!" exceptions in cDelaunayMap for faster debugging * Better Cd * A handling in GUI and input file
</commit_message>
<xml_diff>
--- a/GUI Source/Source.pptx
+++ b/GUI Source/Source.pptx
@@ -289,7 +289,7 @@
           <a:p>
             <a:fld id="{97A49113-99A2-4765-A9CF-E2F1C900EDB7}" type="datetimeFigureOut">
               <a:rPr lang="en-GB" smtClean="0"/>
-              <a:t>22/04/2014</a:t>
+              <a:t>24/04/2014</a:t>
             </a:fld>
             <a:endParaRPr lang="en-GB"/>
           </a:p>
@@ -459,7 +459,7 @@
           <a:p>
             <a:fld id="{97A49113-99A2-4765-A9CF-E2F1C900EDB7}" type="datetimeFigureOut">
               <a:rPr lang="en-GB" smtClean="0"/>
-              <a:t>22/04/2014</a:t>
+              <a:t>24/04/2014</a:t>
             </a:fld>
             <a:endParaRPr lang="en-GB"/>
           </a:p>
@@ -639,7 +639,7 @@
           <a:p>
             <a:fld id="{97A49113-99A2-4765-A9CF-E2F1C900EDB7}" type="datetimeFigureOut">
               <a:rPr lang="en-GB" smtClean="0"/>
-              <a:t>22/04/2014</a:t>
+              <a:t>24/04/2014</a:t>
             </a:fld>
             <a:endParaRPr lang="en-GB"/>
           </a:p>
@@ -809,7 +809,7 @@
           <a:p>
             <a:fld id="{97A49113-99A2-4765-A9CF-E2F1C900EDB7}" type="datetimeFigureOut">
               <a:rPr lang="en-GB" smtClean="0"/>
-              <a:t>22/04/2014</a:t>
+              <a:t>24/04/2014</a:t>
             </a:fld>
             <a:endParaRPr lang="en-GB"/>
           </a:p>
@@ -1055,7 +1055,7 @@
           <a:p>
             <a:fld id="{97A49113-99A2-4765-A9CF-E2F1C900EDB7}" type="datetimeFigureOut">
               <a:rPr lang="en-GB" smtClean="0"/>
-              <a:t>22/04/2014</a:t>
+              <a:t>24/04/2014</a:t>
             </a:fld>
             <a:endParaRPr lang="en-GB"/>
           </a:p>
@@ -1343,7 +1343,7 @@
           <a:p>
             <a:fld id="{97A49113-99A2-4765-A9CF-E2F1C900EDB7}" type="datetimeFigureOut">
               <a:rPr lang="en-GB" smtClean="0"/>
-              <a:t>22/04/2014</a:t>
+              <a:t>24/04/2014</a:t>
             </a:fld>
             <a:endParaRPr lang="en-GB"/>
           </a:p>
@@ -1765,7 +1765,7 @@
           <a:p>
             <a:fld id="{97A49113-99A2-4765-A9CF-E2F1C900EDB7}" type="datetimeFigureOut">
               <a:rPr lang="en-GB" smtClean="0"/>
-              <a:t>22/04/2014</a:t>
+              <a:t>24/04/2014</a:t>
             </a:fld>
             <a:endParaRPr lang="en-GB"/>
           </a:p>
@@ -1883,7 +1883,7 @@
           <a:p>
             <a:fld id="{97A49113-99A2-4765-A9CF-E2F1C900EDB7}" type="datetimeFigureOut">
               <a:rPr lang="en-GB" smtClean="0"/>
-              <a:t>22/04/2014</a:t>
+              <a:t>24/04/2014</a:t>
             </a:fld>
             <a:endParaRPr lang="en-GB"/>
           </a:p>
@@ -1978,7 +1978,7 @@
           <a:p>
             <a:fld id="{97A49113-99A2-4765-A9CF-E2F1C900EDB7}" type="datetimeFigureOut">
               <a:rPr lang="en-GB" smtClean="0"/>
-              <a:t>22/04/2014</a:t>
+              <a:t>24/04/2014</a:t>
             </a:fld>
             <a:endParaRPr lang="en-GB"/>
           </a:p>
@@ -2255,7 +2255,7 @@
           <a:p>
             <a:fld id="{97A49113-99A2-4765-A9CF-E2F1C900EDB7}" type="datetimeFigureOut">
               <a:rPr lang="en-GB" smtClean="0"/>
-              <a:t>22/04/2014</a:t>
+              <a:t>24/04/2014</a:t>
             </a:fld>
             <a:endParaRPr lang="en-GB"/>
           </a:p>
@@ -2508,7 +2508,7 @@
           <a:p>
             <a:fld id="{97A49113-99A2-4765-A9CF-E2F1C900EDB7}" type="datetimeFigureOut">
               <a:rPr lang="en-GB" smtClean="0"/>
-              <a:t>22/04/2014</a:t>
+              <a:t>24/04/2014</a:t>
             </a:fld>
             <a:endParaRPr lang="en-GB"/>
           </a:p>
@@ -2721,7 +2721,7 @@
           <a:p>
             <a:fld id="{97A49113-99A2-4765-A9CF-E2F1C900EDB7}" type="datetimeFigureOut">
               <a:rPr lang="en-GB" smtClean="0"/>
-              <a:t>22/04/2014</a:t>
+              <a:t>24/04/2014</a:t>
             </a:fld>
             <a:endParaRPr lang="en-GB"/>
           </a:p>
@@ -3175,112 +3175,6 @@
           <a:xfrm>
             <a:off x="7860701" y="1693188"/>
             <a:ext cx="978499" cy="3571520"/>
-          </a:xfrm>
-          <a:prstGeom prst="rect">
-            <a:avLst/>
-          </a:prstGeom>
-          <a:noFill/>
-          <a:ln>
-            <a:noFill/>
-          </a:ln>
-          <a:extLst>
-            <a:ext uri="{909E8E84-426E-40DD-AFC4-6F175D3DCCD1}">
-              <a14:hiddenFill xmlns:a14="http://schemas.microsoft.com/office/drawing/2010/main">
-                <a:solidFill>
-                  <a:schemeClr val="accent1"/>
-                </a:solidFill>
-              </a14:hiddenFill>
-            </a:ext>
-            <a:ext uri="{91240B29-F687-4F45-9708-019B960494DF}">
-              <a14:hiddenLine xmlns:a14="http://schemas.microsoft.com/office/drawing/2010/main" w="9525">
-                <a:solidFill>
-                  <a:schemeClr val="tx1"/>
-                </a:solidFill>
-                <a:miter lim="800000"/>
-                <a:headEnd/>
-                <a:tailEnd/>
-              </a14:hiddenLine>
-            </a:ext>
-          </a:extLst>
-        </p:spPr>
-      </p:pic>
-      <p:pic>
-        <p:nvPicPr>
-          <p:cNvPr id="2050" name="Picture 2"/>
-          <p:cNvPicPr>
-            <a:picLocks noChangeAspect="1" noChangeArrowheads="1"/>
-          </p:cNvPicPr>
-          <p:nvPr/>
-        </p:nvPicPr>
-        <p:blipFill>
-          <a:blip r:embed="rId4">
-            <a:extLst>
-              <a:ext uri="{28A0092B-C50C-407E-A947-70E740481C1C}">
-                <a14:useLocalDpi xmlns:a14="http://schemas.microsoft.com/office/drawing/2010/main" val="0"/>
-              </a:ext>
-            </a:extLst>
-          </a:blip>
-          <a:srcRect/>
-          <a:stretch>
-            <a:fillRect/>
-          </a:stretch>
-        </p:blipFill>
-        <p:spPr bwMode="auto">
-          <a:xfrm>
-            <a:off x="8748464" y="2177307"/>
-            <a:ext cx="2193372" cy="3988543"/>
-          </a:xfrm>
-          <a:prstGeom prst="rect">
-            <a:avLst/>
-          </a:prstGeom>
-          <a:noFill/>
-          <a:ln>
-            <a:noFill/>
-          </a:ln>
-          <a:extLst>
-            <a:ext uri="{909E8E84-426E-40DD-AFC4-6F175D3DCCD1}">
-              <a14:hiddenFill xmlns:a14="http://schemas.microsoft.com/office/drawing/2010/main">
-                <a:solidFill>
-                  <a:schemeClr val="accent1"/>
-                </a:solidFill>
-              </a14:hiddenFill>
-            </a:ext>
-            <a:ext uri="{91240B29-F687-4F45-9708-019B960494DF}">
-              <a14:hiddenLine xmlns:a14="http://schemas.microsoft.com/office/drawing/2010/main" w="9525">
-                <a:solidFill>
-                  <a:schemeClr val="tx1"/>
-                </a:solidFill>
-                <a:miter lim="800000"/>
-                <a:headEnd/>
-                <a:tailEnd/>
-              </a14:hiddenLine>
-            </a:ext>
-          </a:extLst>
-        </p:spPr>
-      </p:pic>
-      <p:pic>
-        <p:nvPicPr>
-          <p:cNvPr id="63" name="Picture 2"/>
-          <p:cNvPicPr>
-            <a:picLocks noChangeAspect="1" noChangeArrowheads="1"/>
-          </p:cNvPicPr>
-          <p:nvPr/>
-        </p:nvPicPr>
-        <p:blipFill rotWithShape="1">
-          <a:blip r:embed="rId2">
-            <a:extLst>
-              <a:ext uri="{28A0092B-C50C-407E-A947-70E740481C1C}">
-                <a14:useLocalDpi xmlns:a14="http://schemas.microsoft.com/office/drawing/2010/main" val="0"/>
-              </a:ext>
-            </a:extLst>
-          </a:blip>
-          <a:srcRect l="25200" r="70883" b="9758"/>
-          <a:stretch/>
-        </p:blipFill>
-        <p:spPr bwMode="auto">
-          <a:xfrm>
-            <a:off x="10716658" y="981988"/>
-            <a:ext cx="336062" cy="4282720"/>
           </a:xfrm>
           <a:prstGeom prst="rect">
             <a:avLst/>

</xml_diff>